<commit_message>
Updated the document templates
</commit_message>
<xml_diff>
--- a/Document-Templates/BG-IT-Edu-PowerPoint-Template-June-2023.pptx
+++ b/Document-Templates/BG-IT-Edu-PowerPoint-Template-June-2023.pptx
@@ -285,7 +285,7 @@
           <a:p>
             <a:fld id="{4E087215-0C8F-4762-A664-737A353EC9A4}" type="datetimeFigureOut">
               <a:rPr lang="bg-BG" smtClean="0"/>
-              <a:t>4.7.2023 г.</a:t>
+              <a:t>31.8.2023 г.</a:t>
             </a:fld>
             <a:endParaRPr lang="bg-BG"/>
           </a:p>
@@ -481,7 +481,7 @@
           <a:p>
             <a:fld id="{72D84649-876A-46C9-8472-14CB09C070D8}" type="datetimeFigureOut">
               <a:rPr lang="en-US" smtClean="0"/>
-              <a:t>4-Jul-23</a:t>
+              <a:t>31-Aug-23</a:t>
             </a:fld>
             <a:endParaRPr lang="en-US"/>
           </a:p>
@@ -10627,7 +10627,7 @@
           <a:lstStyle/>
           <a:p>
             <a:r>
-              <a:rPr lang="en-US">
+              <a:rPr lang="en-US" dirty="0">
                 <a:hlinkClick r:id="rId3"/>
               </a:rPr>
               <a:t>https://github.com/BG-IT-Edu</a:t>
@@ -10663,10 +10663,9 @@
           <a:lstStyle/>
           <a:p>
             <a:r>
-              <a:rPr lang="bg-BG"/>
+              <a:rPr lang="bg-BG" dirty="0"/>
               <a:t>Проект "Отворено учебно съдържание по програмиране и ИТ", СофтУни Фондация </a:t>
             </a:r>
-            <a:endParaRPr lang="bg-BG" dirty="0"/>
           </a:p>
         </p:txBody>
       </p:sp>
@@ -10700,7 +10699,7 @@
         </p:blipFill>
         <p:spPr>
           <a:xfrm>
-            <a:off x="6390123" y="4234095"/>
+            <a:off x="6390123" y="4194000"/>
             <a:ext cx="5248260" cy="2188983"/>
           </a:xfrm>
         </p:spPr>
@@ -10723,7 +10722,7 @@
         </p:nvSpPr>
         <p:spPr>
           <a:xfrm>
-            <a:off x="554038" y="1403350"/>
+            <a:off x="554038" y="1449075"/>
             <a:ext cx="11083925" cy="1304925"/>
           </a:xfrm>
         </p:spPr>
@@ -10734,13 +10733,13 @@
           <a:lstStyle/>
           <a:p>
             <a:r>
-              <a:rPr lang="bg-BG"/>
+              <a:rPr lang="bg-BG" dirty="0"/>
               <a:t>Работна група "Образование по програмиране и ИТ"</a:t>
             </a:r>
           </a:p>
           <a:p>
             <a:r>
-              <a:rPr lang="bg-BG"/>
+              <a:rPr lang="bg-BG" dirty="0"/>
               <a:t>Свободно учебно съдържание за учители</a:t>
             </a:r>
             <a:endParaRPr lang="en-US" dirty="0"/>
@@ -21890,7 +21889,7 @@
         </p:nvSpPr>
         <p:spPr>
           <a:xfrm>
-            <a:off x="869725" y="1656226"/>
+            <a:off x="869725" y="1577986"/>
             <a:ext cx="7581212" cy="4772369"/>
           </a:xfrm>
         </p:spPr>
@@ -22137,8 +22136,8 @@
         </p:nvGrpSpPr>
         <p:grpSpPr>
           <a:xfrm>
-            <a:off x="196766" y="1392240"/>
-            <a:ext cx="9715330" cy="5300339"/>
+            <a:off x="196766" y="1314000"/>
+            <a:ext cx="11798468" cy="5300339"/>
             <a:chOff x="472011" y="1508786"/>
             <a:chExt cx="3799787" cy="4865561"/>
           </a:xfrm>
@@ -22319,41 +22318,6 @@
           </p:txBody>
         </p:sp>
       </p:grpSp>
-      <p:pic>
-        <p:nvPicPr>
-          <p:cNvPr id="13" name="Picture 12">
-            <a:extLst>
-              <a:ext uri="{FF2B5EF4-FFF2-40B4-BE49-F238E27FC236}">
-                <a16:creationId xmlns:a16="http://schemas.microsoft.com/office/drawing/2014/main" id="{CCC3A316-993C-4741-8826-E104F27650A3}"/>
-              </a:ext>
-            </a:extLst>
-          </p:cNvPr>
-          <p:cNvPicPr>
-            <a:picLocks noChangeAspect="1"/>
-          </p:cNvPicPr>
-          <p:nvPr/>
-        </p:nvPicPr>
-        <p:blipFill rotWithShape="1">
-          <a:blip r:embed="rId3" cstate="print">
-            <a:extLst>
-              <a:ext uri="{28A0092B-C50C-407E-A947-70E740481C1C}">
-                <a14:useLocalDpi xmlns:a14="http://schemas.microsoft.com/office/drawing/2010/main" val="0"/>
-              </a:ext>
-            </a:extLst>
-          </a:blip>
-          <a:srcRect/>
-          <a:stretch/>
-        </p:blipFill>
-        <p:spPr>
-          <a:xfrm flipH="1">
-            <a:off x="9981762" y="4194000"/>
-            <a:ext cx="2034432" cy="2201767"/>
-          </a:xfrm>
-          <a:prstGeom prst="rect">
-            <a:avLst/>
-          </a:prstGeom>
-        </p:spPr>
-      </p:pic>
       <p:sp>
         <p:nvSpPr>
           <p:cNvPr id="15" name="Content Placeholder 4">
@@ -22370,8 +22334,8 @@
         </p:nvSpPr>
         <p:spPr>
           <a:xfrm>
-            <a:off x="668236" y="1689052"/>
-            <a:ext cx="9028216" cy="4894130"/>
+            <a:off x="668236" y="1610812"/>
+            <a:ext cx="11113508" cy="4894130"/>
           </a:xfrm>
           <a:prstGeom prst="rect">
             <a:avLst/>
@@ -22703,8 +22667,8 @@
         </p:nvSpPr>
         <p:spPr>
           <a:xfrm>
-            <a:off x="1146000" y="2316368"/>
-            <a:ext cx="8100000" cy="1517632"/>
+            <a:off x="1145999" y="2238128"/>
+            <a:ext cx="10176275" cy="1517632"/>
           </a:xfrm>
           <a:prstGeom prst="rect">
             <a:avLst/>
@@ -22929,8 +22893,8 @@
         </p:nvSpPr>
         <p:spPr>
           <a:xfrm>
-            <a:off x="1146000" y="5643718"/>
-            <a:ext cx="8100000" cy="588147"/>
+            <a:off x="1145999" y="5135853"/>
+            <a:ext cx="10176275" cy="588147"/>
           </a:xfrm>
           <a:prstGeom prst="rect">
             <a:avLst/>
@@ -23371,7 +23335,41 @@
                 <a:ea typeface="Calibri" panose="020F0502020204030204" pitchFamily="34" charset="0"/>
                 <a:cs typeface="Arial" panose="020B0604020202020204" pitchFamily="34" charset="0"/>
               </a:rPr>
-              <a:t>Проект "Отворено учебно съдържание по програмиране и ИТ", СофтУни Фондация (лиценз </a:t>
+              <a:t>Проект "</a:t>
+            </a:r>
+            <a:r>
+              <a:rPr lang="bg-BG" sz="1600" dirty="0">
+                <a:solidFill>
+                  <a:schemeClr val="bg1">
+                    <a:lumMod val="20000"/>
+                    <a:lumOff val="80000"/>
+                  </a:schemeClr>
+                </a:solidFill>
+                <a:effectLst/>
+                <a:latin typeface="Calibri" panose="020F0502020204030204" pitchFamily="34" charset="0"/>
+                <a:ea typeface="Calibri" panose="020F0502020204030204" pitchFamily="34" charset="0"/>
+                <a:cs typeface="Arial" panose="020B0604020202020204" pitchFamily="34" charset="0"/>
+                <a:hlinkClick r:id="rId3">
+                  <a:extLst>
+                    <a:ext uri="{A12FA001-AC4F-418D-AE19-62706E023703}">
+                      <ahyp:hlinkClr xmlns:ahyp="http://schemas.microsoft.com/office/drawing/2018/hyperlinkcolor" val="tx"/>
+                    </a:ext>
+                  </a:extLst>
+                </a:hlinkClick>
+              </a:rPr>
+              <a:t>Отворено учебно съдържание по програмиране и ИТ</a:t>
+            </a:r>
+            <a:r>
+              <a:rPr lang="bg-BG" sz="1600" dirty="0">
+                <a:solidFill>
+                  <a:schemeClr val="bg2"/>
+                </a:solidFill>
+                <a:effectLst/>
+                <a:latin typeface="Calibri" panose="020F0502020204030204" pitchFamily="34" charset="0"/>
+                <a:ea typeface="Calibri" panose="020F0502020204030204" pitchFamily="34" charset="0"/>
+                <a:cs typeface="Arial" panose="020B0604020202020204" pitchFamily="34" charset="0"/>
+              </a:rPr>
+              <a:t>", СофтУни Фондация (лиценз </a:t>
             </a:r>
             <a:r>
               <a:rPr lang="en-US" sz="1600" dirty="0">
@@ -23431,7 +23429,7 @@
 </file>
 
 <file path=ppt/slides/slide22.xml><?xml version="1.0" encoding="utf-8"?>
-<p:sld xmlns:a="http://schemas.openxmlformats.org/drawingml/2006/main" xmlns:r="http://schemas.openxmlformats.org/officeDocument/2006/relationships" xmlns:p="http://schemas.openxmlformats.org/presentationml/2006/main" show="0">
+<p:sld xmlns:a="http://schemas.openxmlformats.org/drawingml/2006/main" xmlns:r="http://schemas.openxmlformats.org/officeDocument/2006/relationships" xmlns:p="http://schemas.openxmlformats.org/presentationml/2006/main">
   <p:cSld>
     <p:spTree>
       <p:nvGrpSpPr>
@@ -23595,8 +23593,8 @@
         </p:blipFill>
         <p:spPr>
           <a:xfrm>
-            <a:off x="10365884" y="1437412"/>
-            <a:ext cx="990897" cy="1048661"/>
+            <a:off x="10226175" y="1440120"/>
+            <a:ext cx="1198986" cy="1268880"/>
           </a:xfrm>
           <a:prstGeom prst="rect">
             <a:avLst/>
@@ -23774,8 +23772,8 @@
         </p:blipFill>
         <p:spPr bwMode="auto">
           <a:xfrm>
-            <a:off x="9956664" y="2940081"/>
-            <a:ext cx="1809336" cy="633045"/>
+            <a:off x="9831000" y="2908593"/>
+            <a:ext cx="1989336" cy="696022"/>
           </a:xfrm>
           <a:prstGeom prst="roundRect">
             <a:avLst>

</xml_diff>